<commit_message>
second week pick up iot updated 1
</commit_message>
<xml_diff>
--- a/Second_week/Picking up IoT.pptx
+++ b/Second_week/Picking up IoT.pptx
@@ -12,6 +12,7 @@
     <p:sldId id="260" r:id="rId6"/>
     <p:sldId id="261" r:id="rId7"/>
     <p:sldId id="262" r:id="rId8"/>
+    <p:sldId id="263" r:id="rId9"/>
   </p:sldIdLst>
   <p:sldSz cx="12192000" cy="6858000"/>
   <p:notesSz cx="6858000" cy="9144000"/>
@@ -4516,48 +4517,58 @@
         <p:spPr/>
         <p:txBody>
           <a:bodyPr vert="horz" lIns="91440" tIns="45720" rIns="91440" bIns="45720" rtlCol="0" anchor="t">
-            <a:normAutofit lnSpcReduction="10000"/>
+            <a:normAutofit/>
           </a:bodyPr>
           <a:lstStyle/>
+          <a:p>
+            <a:pPr algn="just"/>
+            <a:r>
+              <a:rPr lang="en-US" b="1" dirty="0">
+                <a:latin typeface="Times New Roman" panose="02020603050405020304" pitchFamily="18" charset="0"/>
+                <a:cs typeface="Times New Roman" panose="02020603050405020304" pitchFamily="18" charset="0"/>
+              </a:rPr>
+              <a:t>Reason</a:t>
+            </a:r>
+            <a:r>
+              <a:rPr lang="en-US" dirty="0">
+                <a:latin typeface="Times New Roman" panose="02020603050405020304" pitchFamily="18" charset="0"/>
+                <a:cs typeface="Times New Roman" panose="02020603050405020304" pitchFamily="18" charset="0"/>
+              </a:rPr>
+              <a:t>: old and already well-known vulnerabilities , bug that lead security loopholes, outdated software, non-existent authentication, weak encryption protocols, unaware consumers</a:t>
+            </a:r>
+          </a:p>
+          <a:p>
+            <a:pPr algn="just"/>
+            <a:endParaRPr lang="en-US" dirty="0">
+              <a:latin typeface="Times New Roman" panose="02020603050405020304" pitchFamily="18" charset="0"/>
+              <a:cs typeface="Times New Roman" panose="02020603050405020304" pitchFamily="18" charset="0"/>
+            </a:endParaRPr>
+          </a:p>
+          <a:p>
+            <a:r>
+              <a:rPr lang="en-US" dirty="0">
+                <a:latin typeface="Times New Roman" panose="02020603050405020304" pitchFamily="18" charset="0"/>
+                <a:cs typeface="Times New Roman" panose="02020603050405020304" pitchFamily="18" charset="0"/>
+              </a:rPr>
+              <a:t>Vulnerable IoT device: IoT-enabled insulin dispensers and pacemakers </a:t>
+            </a:r>
+          </a:p>
+          <a:p>
+            <a:endParaRPr lang="en-US" dirty="0">
+              <a:latin typeface="Times New Roman" panose="02020603050405020304" pitchFamily="18" charset="0"/>
+              <a:cs typeface="Times New Roman" panose="02020603050405020304" pitchFamily="18" charset="0"/>
+            </a:endParaRPr>
+          </a:p>
           <a:p>
             <a:r>
               <a:rPr lang="en-US" dirty="0">
                 <a:cs typeface="Calibri"/>
               </a:rPr>
-              <a:t>To be sure, IoT is not just about our personal efficiency or enjoyment, and the class of products such as smart watches or smart light bulbs. Spurred by innovations in hardware, networking, cloud data management, big data, and machine learning, IoT is also taking many industries by storm. This includes those classed as belonging to critical infrastructure, as various sectors invest in the Industrial Internet-of-Things (</a:t>
-            </a:r>
-            <a:r>
-              <a:rPr lang="en-US" dirty="0" err="1">
-                <a:cs typeface="Calibri"/>
-              </a:rPr>
-              <a:t>IIoT</a:t>
-            </a:r>
-            <a:r>
-              <a:rPr lang="en-US" dirty="0">
-                <a:cs typeface="Calibri"/>
-              </a:rPr>
-              <a:t>), with the intent of enhancing the efficiency of infrastructure, energy management, health care, utilities, and other public services.</a:t>
-            </a:r>
-          </a:p>
-          <a:p>
-            <a:r>
-              <a:rPr lang="en-US">
-                <a:cs typeface="Calibri"/>
-              </a:rPr>
-              <a:t>5. Available at: https://www.welivesecurity.com/2018/10/26/iot-</a:t>
-            </a:r>
-            <a:r>
-              <a:rPr lang="en-US" dirty="0">
-                <a:cs typeface="Calibri"/>
-              </a:rPr>
-              <a:t>roomful-conundrums/</a:t>
-            </a:r>
-            <a:endParaRPr lang="en-US">
-              <a:cs typeface="Calibri"/>
-            </a:endParaRPr>
-          </a:p>
-          <a:p>
-            <a:endParaRPr lang="en-US">
+              <a:t>5. Available at: https://www.welivesecurity.com/2018/10/26/iot-roomful-conundrums/</a:t>
+            </a:r>
+          </a:p>
+          <a:p>
+            <a:endParaRPr lang="en-US" dirty="0">
               <a:cs typeface="Calibri"/>
             </a:endParaRPr>
           </a:p>
@@ -4619,7 +4630,14 @@
           <a:bodyPr/>
           <a:lstStyle/>
           <a:p>
-            <a:endParaRPr lang="en-US"/>
+            <a:r>
+              <a:rPr lang="en-US" dirty="0">
+                <a:latin typeface="Times New Roman"/>
+                <a:cs typeface="Times New Roman"/>
+              </a:rPr>
+              <a:t>Review online</a:t>
+            </a:r>
+            <a:endParaRPr lang="en-US" dirty="0"/>
           </a:p>
         </p:txBody>
       </p:sp>
@@ -4642,19 +4660,75 @@
         <p:spPr/>
         <p:txBody>
           <a:bodyPr vert="horz" lIns="91440" tIns="45720" rIns="91440" bIns="45720" rtlCol="0" anchor="t">
-            <a:normAutofit/>
+            <a:normAutofit fontScale="92500" lnSpcReduction="10000"/>
           </a:bodyPr>
           <a:lstStyle/>
           <a:p>
-            <a:r>
+            <a:pPr fontAlgn="base"/>
+            <a:r>
+              <a:rPr lang="en-US" b="1" dirty="0">
+                <a:latin typeface="Times New Roman" panose="02020603050405020304" pitchFamily="18" charset="0"/>
+                <a:cs typeface="Times New Roman" panose="02020603050405020304" pitchFamily="18" charset="0"/>
+              </a:rPr>
+              <a:t>Reason</a:t>
+            </a:r>
+            <a:r>
+              <a:rPr lang="en-US" dirty="0">
+                <a:latin typeface="Times New Roman" panose="02020603050405020304" pitchFamily="18" charset="0"/>
+                <a:cs typeface="Times New Roman" panose="02020603050405020304" pitchFamily="18" charset="0"/>
+              </a:rPr>
+              <a:t>: weak system where hacker can install malware easily, unsecured home network, lack of appropriate controls in critical infrastructure, unsecured IoT devices that connect to the home network </a:t>
+            </a:r>
+          </a:p>
+          <a:p>
+            <a:pPr fontAlgn="base"/>
+            <a:r>
+              <a:rPr lang="en-US" b="1" dirty="0">
+                <a:latin typeface="Times New Roman" panose="02020603050405020304" pitchFamily="18" charset="0"/>
+                <a:cs typeface="Times New Roman" panose="02020603050405020304" pitchFamily="18" charset="0"/>
+              </a:rPr>
+              <a:t>Vulnerable IoT device</a:t>
+            </a:r>
+            <a:r>
+              <a:rPr lang="en-US" dirty="0">
+                <a:latin typeface="Times New Roman" panose="02020603050405020304" pitchFamily="18" charset="0"/>
+                <a:cs typeface="Times New Roman" panose="02020603050405020304" pitchFamily="18" charset="0"/>
+              </a:rPr>
+              <a:t>: Consumer-Related Devices(baby monitor or a connected toaster), Utilities and Critical Infrastructure, Health Care, Trucking (truck drivers)</a:t>
+            </a:r>
+          </a:p>
+          <a:p>
+            <a:pPr marL="0" indent="0">
+              <a:buNone/>
+            </a:pPr>
+            <a:br>
               <a:rPr lang="en-US" dirty="0"/>
-              <a:t>4 Sectors More Vulnerable Because of IoT</a:t>
-            </a:r>
+            </a:br>
             <a:endParaRPr lang="en-US" dirty="0">
               <a:cs typeface="Calibri" panose="020F0502020204030204"/>
             </a:endParaRPr>
           </a:p>
           <a:p>
+            <a:pPr fontAlgn="base"/>
+            <a:r>
+              <a:rPr lang="en-US" u="sng" dirty="0">
+                <a:latin typeface="Times New Roman" panose="02020603050405020304" pitchFamily="18" charset="0"/>
+                <a:cs typeface="Times New Roman" panose="02020603050405020304" pitchFamily="18" charset="0"/>
+                <a:hlinkClick r:id="rId2">
+                  <a:extLst>
+                    <a:ext uri="{A12FA001-AC4F-418D-AE19-62706E023703}">
+                      <ahyp:hlinkClr xmlns:ahyp="http://schemas.microsoft.com/office/drawing/2018/hyperlinkcolor" val="tx"/>
+                    </a:ext>
+                  </a:extLst>
+                </a:hlinkClick>
+              </a:rPr>
+              <a:t>Available at:</a:t>
+            </a:r>
+          </a:p>
+          <a:p>
+            <a:pPr marL="0" indent="0">
+              <a:buNone/>
+            </a:pPr>
             <a:r>
               <a:rPr lang="en-US" dirty="0">
                 <a:cs typeface="Calibri"/>
@@ -4674,6 +4748,161 @@
     <p:extLst>
       <p:ext uri="{BB962C8B-B14F-4D97-AF65-F5344CB8AC3E}">
         <p14:creationId xmlns:p14="http://schemas.microsoft.com/office/powerpoint/2010/main" val="1291115647"/>
+      </p:ext>
+    </p:extLst>
+  </p:cSld>
+  <p:clrMapOvr>
+    <a:masterClrMapping/>
+  </p:clrMapOvr>
+</p:sld>
+</file>
+
+<file path=ppt/slides/slide8.xml><?xml version="1.0" encoding="utf-8"?>
+<p:sld xmlns:a="http://schemas.openxmlformats.org/drawingml/2006/main" xmlns:r="http://schemas.openxmlformats.org/officeDocument/2006/relationships" xmlns:p="http://schemas.openxmlformats.org/presentationml/2006/main">
+  <p:cSld>
+    <p:spTree>
+      <p:nvGrpSpPr>
+        <p:cNvPr id="1" name=""/>
+        <p:cNvGrpSpPr/>
+        <p:nvPr/>
+      </p:nvGrpSpPr>
+      <p:grpSpPr>
+        <a:xfrm>
+          <a:off x="0" y="0"/>
+          <a:ext cx="0" cy="0"/>
+          <a:chOff x="0" y="0"/>
+          <a:chExt cx="0" cy="0"/>
+        </a:xfrm>
+      </p:grpSpPr>
+      <p:sp>
+        <p:nvSpPr>
+          <p:cNvPr id="2" name="Title 1">
+            <a:extLst>
+              <a:ext uri="{FF2B5EF4-FFF2-40B4-BE49-F238E27FC236}">
+                <a16:creationId xmlns:a16="http://schemas.microsoft.com/office/drawing/2014/main" id="{67B2DC43-9303-415F-923B-D74B2857397D}"/>
+              </a:ext>
+            </a:extLst>
+          </p:cNvPr>
+          <p:cNvSpPr>
+            <a:spLocks noGrp="1"/>
+          </p:cNvSpPr>
+          <p:nvPr>
+            <p:ph type="title"/>
+          </p:nvPr>
+        </p:nvSpPr>
+        <p:spPr/>
+        <p:txBody>
+          <a:bodyPr/>
+          <a:lstStyle/>
+          <a:p>
+            <a:r>
+              <a:rPr lang="en-US" dirty="0">
+                <a:latin typeface="Times New Roman" panose="02020603050405020304" pitchFamily="18" charset="0"/>
+                <a:cs typeface="Times New Roman" panose="02020603050405020304" pitchFamily="18" charset="0"/>
+              </a:rPr>
+              <a:t>Review Online</a:t>
+            </a:r>
+          </a:p>
+        </p:txBody>
+      </p:sp>
+      <p:sp>
+        <p:nvSpPr>
+          <p:cNvPr id="3" name="Content Placeholder 2">
+            <a:extLst>
+              <a:ext uri="{FF2B5EF4-FFF2-40B4-BE49-F238E27FC236}">
+                <a16:creationId xmlns:a16="http://schemas.microsoft.com/office/drawing/2014/main" id="{42B31707-D6FD-4C75-AC1C-FE1BF613E199}"/>
+              </a:ext>
+            </a:extLst>
+          </p:cNvPr>
+          <p:cNvSpPr>
+            <a:spLocks noGrp="1"/>
+          </p:cNvSpPr>
+          <p:nvPr>
+            <p:ph idx="1"/>
+          </p:nvPr>
+        </p:nvSpPr>
+        <p:spPr>
+          <a:xfrm>
+            <a:off x="838200" y="1323975"/>
+            <a:ext cx="10515600" cy="4852988"/>
+          </a:xfrm>
+        </p:spPr>
+        <p:txBody>
+          <a:bodyPr>
+            <a:normAutofit/>
+          </a:bodyPr>
+          <a:lstStyle/>
+          <a:p>
+            <a:r>
+              <a:rPr lang="en-US" b="1" dirty="0">
+                <a:latin typeface="Times New Roman" panose="02020603050405020304" pitchFamily="18" charset="0"/>
+                <a:cs typeface="Times New Roman" panose="02020603050405020304" pitchFamily="18" charset="0"/>
+              </a:rPr>
+              <a:t>Reason: </a:t>
+            </a:r>
+            <a:r>
+              <a:rPr lang="en-US" dirty="0">
+                <a:latin typeface="Times New Roman" panose="02020603050405020304" pitchFamily="18" charset="0"/>
+                <a:cs typeface="Times New Roman" panose="02020603050405020304" pitchFamily="18" charset="0"/>
+              </a:rPr>
+              <a:t>Open to world or weakly controlled</a:t>
+            </a:r>
+          </a:p>
+          <a:p>
+            <a:endParaRPr lang="en-US" b="1" dirty="0">
+              <a:latin typeface="Times New Roman" panose="02020603050405020304" pitchFamily="18" charset="0"/>
+              <a:cs typeface="Times New Roman" panose="02020603050405020304" pitchFamily="18" charset="0"/>
+            </a:endParaRPr>
+          </a:p>
+          <a:p>
+            <a:pPr algn="just"/>
+            <a:r>
+              <a:rPr lang="en-US" b="1" dirty="0">
+                <a:latin typeface="Times New Roman" panose="02020603050405020304" pitchFamily="18" charset="0"/>
+                <a:cs typeface="Times New Roman" panose="02020603050405020304" pitchFamily="18" charset="0"/>
+              </a:rPr>
+              <a:t>Vulnerable IoT device</a:t>
+            </a:r>
+            <a:r>
+              <a:rPr lang="en-US" dirty="0">
+                <a:latin typeface="Times New Roman" panose="02020603050405020304" pitchFamily="18" charset="0"/>
+                <a:cs typeface="Times New Roman" panose="02020603050405020304" pitchFamily="18" charset="0"/>
+              </a:rPr>
+              <a:t>: RFID enabled credit cards, home automation, smart doorbell, home routers, smart appliances, smart hub in home network, smart coffee machine , Wearable, Smart Plug, Cameras, Traffic Lights, Automobiles, Airplanes, Light Bulbs, Locks, Smart Scale, Smart Meters, Pacemaker, Thermostats, Fridge, Media Player &amp; TV, Firearms, </a:t>
+            </a:r>
+            <a:r>
+              <a:rPr lang="en-US" dirty="0" err="1">
+                <a:latin typeface="Times New Roman" panose="02020603050405020304" pitchFamily="18" charset="0"/>
+                <a:cs typeface="Times New Roman" panose="02020603050405020304" pitchFamily="18" charset="0"/>
+              </a:rPr>
+              <a:t>Toilet,Toys</a:t>
+            </a:r>
+            <a:r>
+              <a:rPr lang="en-US" dirty="0">
+                <a:latin typeface="Times New Roman" panose="02020603050405020304" pitchFamily="18" charset="0"/>
+                <a:cs typeface="Times New Roman" panose="02020603050405020304" pitchFamily="18" charset="0"/>
+              </a:rPr>
+              <a:t>, Drones,</a:t>
+            </a:r>
+          </a:p>
+          <a:p>
+            <a:br>
+              <a:rPr lang="en-US"/>
+            </a:br>
+            <a:endParaRPr lang="en-US" dirty="0"/>
+          </a:p>
+          <a:p>
+            <a:r>
+              <a:rPr lang="en-US" dirty="0"/>
+              <a:t>Available at: https://github.com/nebgnahz/awesome-iot-hacks</a:t>
+            </a:r>
+          </a:p>
+        </p:txBody>
+      </p:sp>
+    </p:spTree>
+    <p:extLst>
+      <p:ext uri="{BB962C8B-B14F-4D97-AF65-F5344CB8AC3E}">
+        <p14:creationId xmlns:p14="http://schemas.microsoft.com/office/powerpoint/2010/main" val="3970098669"/>
       </p:ext>
     </p:extLst>
   </p:cSld>

</xml_diff>